<commit_message>
Update links on readme
</commit_message>
<xml_diff>
--- a/Other_files_and workings/Identifying_Lowest_Risk_Aircraft_for_Investment.pptx
+++ b/Other_files_and workings/Identifying_Lowest_Risk_Aircraft_for_Investment.pptx
@@ -116,6 +116,11 @@
       </a:defRPr>
     </a:lvl9pPr>
   </p:defaultTextStyle>
+  <p:extLst>
+    <p:ext uri="{EFAFB233-063F-42B5-8137-9DF3F51BA10A}">
+      <p15:sldGuideLst xmlns:p15="http://schemas.microsoft.com/office/powerpoint/2012/main"/>
+    </p:ext>
+  </p:extLst>
 </p:presentation>
 </file>
 
@@ -2771,8 +2776,8 @@
 <p:sldMaster xmlns:a="http://schemas.openxmlformats.org/drawingml/2006/main" xmlns:r="http://schemas.openxmlformats.org/officeDocument/2006/relationships" xmlns:p="http://schemas.openxmlformats.org/presentationml/2006/main">
   <p:cSld>
     <p:bg>
-      <p:bgRef idx="1001">
-        <a:schemeClr val="bg1"/>
+      <p:bgRef idx="1002">
+        <a:schemeClr val="bg2"/>
       </p:bgRef>
     </p:bg>
     <p:spTree>
@@ -3040,7 +3045,7 @@
       </p:ext>
     </p:extLst>
   </p:cSld>
-  <p:clrMap bg1="lt1" tx1="dk1" bg2="lt2" tx2="dk2" accent1="accent1" accent2="accent2" accent3="accent3" accent4="accent4" accent5="accent5" accent6="accent6" hlink="hlink" folHlink="folHlink"/>
+  <p:clrMap bg1="dk1" tx1="lt1" bg2="dk2" tx2="lt2" accent1="accent1" accent2="accent2" accent3="accent3" accent4="accent4" accent5="accent5" accent6="accent6" hlink="hlink" folHlink="folHlink"/>
   <p:sldLayoutIdLst>
     <p:sldLayoutId id="2147483649" r:id="rId1"/>
     <p:sldLayoutId id="2147483650" r:id="rId2"/>

</xml_diff>